<commit_message>
remove geom from sample dependency workflow
</commit_message>
<xml_diff>
--- a/documents/sample dependency workflow.pptx
+++ b/documents/sample dependency workflow.pptx
@@ -251,7 +251,7 @@
           <a:p>
             <a:fld id="{053D9C46-81F7-41F7-AFAE-BFEBBA175E9B}" type="datetimeFigureOut">
               <a:rPr lang="en-US" smtClean="0"/>
-              <a:t>1/26/2022</a:t>
+              <a:t>4/20/2023</a:t>
             </a:fld>
             <a:endParaRPr lang="en-US"/>
           </a:p>
@@ -419,7 +419,7 @@
           <a:p>
             <a:fld id="{053D9C46-81F7-41F7-AFAE-BFEBBA175E9B}" type="datetimeFigureOut">
               <a:rPr lang="en-US" smtClean="0"/>
-              <a:t>1/26/2022</a:t>
+              <a:t>4/20/2023</a:t>
             </a:fld>
             <a:endParaRPr lang="en-US"/>
           </a:p>
@@ -597,7 +597,7 @@
           <a:p>
             <a:fld id="{053D9C46-81F7-41F7-AFAE-BFEBBA175E9B}" type="datetimeFigureOut">
               <a:rPr lang="en-US" smtClean="0"/>
-              <a:t>1/26/2022</a:t>
+              <a:t>4/20/2023</a:t>
             </a:fld>
             <a:endParaRPr lang="en-US"/>
           </a:p>
@@ -765,7 +765,7 @@
           <a:p>
             <a:fld id="{053D9C46-81F7-41F7-AFAE-BFEBBA175E9B}" type="datetimeFigureOut">
               <a:rPr lang="en-US" smtClean="0"/>
-              <a:t>1/26/2022</a:t>
+              <a:t>4/20/2023</a:t>
             </a:fld>
             <a:endParaRPr lang="en-US"/>
           </a:p>
@@ -1010,7 +1010,7 @@
           <a:p>
             <a:fld id="{053D9C46-81F7-41F7-AFAE-BFEBBA175E9B}" type="datetimeFigureOut">
               <a:rPr lang="en-US" smtClean="0"/>
-              <a:t>1/26/2022</a:t>
+              <a:t>4/20/2023</a:t>
             </a:fld>
             <a:endParaRPr lang="en-US"/>
           </a:p>
@@ -1239,7 +1239,7 @@
           <a:p>
             <a:fld id="{053D9C46-81F7-41F7-AFAE-BFEBBA175E9B}" type="datetimeFigureOut">
               <a:rPr lang="en-US" smtClean="0"/>
-              <a:t>1/26/2022</a:t>
+              <a:t>4/20/2023</a:t>
             </a:fld>
             <a:endParaRPr lang="en-US"/>
           </a:p>
@@ -1603,7 +1603,7 @@
           <a:p>
             <a:fld id="{053D9C46-81F7-41F7-AFAE-BFEBBA175E9B}" type="datetimeFigureOut">
               <a:rPr lang="en-US" smtClean="0"/>
-              <a:t>1/26/2022</a:t>
+              <a:t>4/20/2023</a:t>
             </a:fld>
             <a:endParaRPr lang="en-US"/>
           </a:p>
@@ -1720,7 +1720,7 @@
           <a:p>
             <a:fld id="{053D9C46-81F7-41F7-AFAE-BFEBBA175E9B}" type="datetimeFigureOut">
               <a:rPr lang="en-US" smtClean="0"/>
-              <a:t>1/26/2022</a:t>
+              <a:t>4/20/2023</a:t>
             </a:fld>
             <a:endParaRPr lang="en-US"/>
           </a:p>
@@ -1815,7 +1815,7 @@
           <a:p>
             <a:fld id="{053D9C46-81F7-41F7-AFAE-BFEBBA175E9B}" type="datetimeFigureOut">
               <a:rPr lang="en-US" smtClean="0"/>
-              <a:t>1/26/2022</a:t>
+              <a:t>4/20/2023</a:t>
             </a:fld>
             <a:endParaRPr lang="en-US"/>
           </a:p>
@@ -2090,7 +2090,7 @@
           <a:p>
             <a:fld id="{053D9C46-81F7-41F7-AFAE-BFEBBA175E9B}" type="datetimeFigureOut">
               <a:rPr lang="en-US" smtClean="0"/>
-              <a:t>1/26/2022</a:t>
+              <a:t>4/20/2023</a:t>
             </a:fld>
             <a:endParaRPr lang="en-US"/>
           </a:p>
@@ -2342,7 +2342,7 @@
           <a:p>
             <a:fld id="{053D9C46-81F7-41F7-AFAE-BFEBBA175E9B}" type="datetimeFigureOut">
               <a:rPr lang="en-US" smtClean="0"/>
-              <a:t>1/26/2022</a:t>
+              <a:t>4/20/2023</a:t>
             </a:fld>
             <a:endParaRPr lang="en-US"/>
           </a:p>
@@ -2553,7 +2553,7 @@
           <a:p>
             <a:fld id="{053D9C46-81F7-41F7-AFAE-BFEBBA175E9B}" type="datetimeFigureOut">
               <a:rPr lang="en-US" smtClean="0"/>
-              <a:t>1/26/2022</a:t>
+              <a:t>4/20/2023</a:t>
             </a:fld>
             <a:endParaRPr lang="en-US"/>
           </a:p>
@@ -12852,8 +12852,8 @@
         </p:nvCxnSpPr>
         <p:spPr>
           <a:xfrm rot="16200000" flipH="1">
-            <a:off x="6080722" y="3327098"/>
-            <a:ext cx="916074" cy="66540"/>
+            <a:off x="6060179" y="3306555"/>
+            <a:ext cx="880406" cy="143294"/>
           </a:xfrm>
           <a:prstGeom prst="curvedConnector3">
             <a:avLst>
@@ -13056,7 +13056,7 @@
         </p:nvSpPr>
         <p:spPr>
           <a:xfrm>
-            <a:off x="6042402" y="2661630"/>
+            <a:off x="5965648" y="2697298"/>
             <a:ext cx="926173" cy="240701"/>
           </a:xfrm>
           <a:prstGeom prst="roundRect">
@@ -13149,8 +13149,8 @@
         </p:nvCxnSpPr>
         <p:spPr>
           <a:xfrm rot="5400000">
-            <a:off x="5865368" y="2891880"/>
-            <a:ext cx="629671" cy="650572"/>
+            <a:off x="5844825" y="2948091"/>
+            <a:ext cx="594003" cy="573818"/>
           </a:xfrm>
           <a:prstGeom prst="curvedConnector3">
             <a:avLst>
@@ -13242,7 +13242,7 @@
         </p:nvSpPr>
         <p:spPr>
           <a:xfrm>
-            <a:off x="6813302" y="3059577"/>
+            <a:off x="7233623" y="3225969"/>
             <a:ext cx="926173" cy="240701"/>
           </a:xfrm>
           <a:prstGeom prst="roundRect">
@@ -13283,64 +13283,6 @@
                 </a:solidFill>
               </a:rPr>
               <a:t>geomcell</a:t>
-            </a:r>
-            <a:endParaRPr lang="en-US" sz="800" dirty="0">
-              <a:solidFill>
-                <a:schemeClr val="tx1"/>
-              </a:solidFill>
-            </a:endParaRPr>
-          </a:p>
-        </p:txBody>
-      </p:sp>
-      <p:sp>
-        <p:nvSpPr>
-          <p:cNvPr id="85" name="Rounded Rectangle 84"/>
-          <p:cNvSpPr/>
-          <p:nvPr/>
-        </p:nvSpPr>
-        <p:spPr>
-          <a:xfrm>
-            <a:off x="7060751" y="2051869"/>
-            <a:ext cx="926173" cy="240701"/>
-          </a:xfrm>
-          <a:prstGeom prst="roundRect">
-            <a:avLst/>
-          </a:prstGeom>
-          <a:solidFill>
-            <a:schemeClr val="accent2">
-              <a:lumMod val="20000"/>
-              <a:lumOff val="80000"/>
-            </a:schemeClr>
-          </a:solidFill>
-        </p:spPr>
-        <p:style>
-          <a:lnRef idx="2">
-            <a:schemeClr val="accent1">
-              <a:shade val="50000"/>
-            </a:schemeClr>
-          </a:lnRef>
-          <a:fillRef idx="1">
-            <a:schemeClr val="accent1"/>
-          </a:fillRef>
-          <a:effectRef idx="0">
-            <a:schemeClr val="accent1"/>
-          </a:effectRef>
-          <a:fontRef idx="minor">
-            <a:schemeClr val="lt1"/>
-          </a:fontRef>
-        </p:style>
-        <p:txBody>
-          <a:bodyPr rtlCol="0" anchor="ctr"/>
-          <a:lstStyle/>
-          <a:p>
-            <a:pPr algn="ctr"/>
-            <a:r>
-              <a:rPr lang="en-US" sz="800" dirty="0" err="1">
-                <a:solidFill>
-                  <a:schemeClr val="tx1"/>
-                </a:solidFill>
-              </a:rPr>
-              <a:t>geom</a:t>
             </a:r>
             <a:endParaRPr lang="en-US" sz="800" dirty="0">
               <a:solidFill>
@@ -13362,8 +13304,8 @@
         </p:nvCxnSpPr>
         <p:spPr>
           <a:xfrm rot="5400000">
-            <a:off x="6680891" y="3820532"/>
-            <a:ext cx="1115752" cy="75245"/>
+            <a:off x="6974247" y="3693567"/>
+            <a:ext cx="949360" cy="495566"/>
           </a:xfrm>
           <a:prstGeom prst="curvedConnector3">
             <a:avLst>
@@ -14794,50 +14736,11 @@
         </p:nvCxnSpPr>
         <p:spPr>
           <a:xfrm flipV="1">
-            <a:off x="5147181" y="3179928"/>
-            <a:ext cx="1666121" cy="340856"/>
+            <a:off x="5147181" y="3346320"/>
+            <a:ext cx="2086442" cy="174464"/>
           </a:xfrm>
           <a:prstGeom prst="curvedConnector3">
             <a:avLst/>
-          </a:prstGeom>
-          <a:ln>
-            <a:tailEnd type="triangle"/>
-          </a:ln>
-        </p:spPr>
-        <p:style>
-          <a:lnRef idx="1">
-            <a:schemeClr val="accent1"/>
-          </a:lnRef>
-          <a:fillRef idx="0">
-            <a:schemeClr val="accent1"/>
-          </a:fillRef>
-          <a:effectRef idx="0">
-            <a:schemeClr val="accent1"/>
-          </a:effectRef>
-          <a:fontRef idx="minor">
-            <a:schemeClr val="tx1"/>
-          </a:fontRef>
-        </p:style>
-      </p:cxnSp>
-      <p:cxnSp>
-        <p:nvCxnSpPr>
-          <p:cNvPr id="132" name="Curved Connector 131"/>
-          <p:cNvCxnSpPr>
-            <a:cxnSpLocks/>
-            <a:stCxn id="54" idx="2"/>
-            <a:endCxn id="85" idx="0"/>
-          </p:cNvCxnSpPr>
-          <p:nvPr/>
-        </p:nvCxnSpPr>
-        <p:spPr>
-          <a:xfrm rot="16200000" flipH="1">
-            <a:off x="7172536" y="1700566"/>
-            <a:ext cx="208431" cy="494174"/>
-          </a:xfrm>
-          <a:prstGeom prst="curvedConnector3">
-            <a:avLst>
-              <a:gd name="adj1" fmla="val 50000"/>
-            </a:avLst>
           </a:prstGeom>
           <a:ln>
             <a:tailEnd type="triangle"/>
@@ -14907,8 +14810,8 @@
         </p:nvCxnSpPr>
         <p:spPr>
           <a:xfrm flipV="1">
-            <a:off x="5142885" y="2781981"/>
-            <a:ext cx="899517" cy="329631"/>
+            <a:off x="5142885" y="2817649"/>
+            <a:ext cx="822763" cy="293963"/>
           </a:xfrm>
           <a:prstGeom prst="curvedConnector3">
             <a:avLst>
@@ -15067,44 +14970,6 @@
           <a:prstGeom prst="curvedConnector3">
             <a:avLst>
               <a:gd name="adj1" fmla="val 84888"/>
-            </a:avLst>
-          </a:prstGeom>
-          <a:ln>
-            <a:tailEnd type="triangle"/>
-          </a:ln>
-        </p:spPr>
-        <p:style>
-          <a:lnRef idx="1">
-            <a:schemeClr val="accent1"/>
-          </a:lnRef>
-          <a:fillRef idx="0">
-            <a:schemeClr val="accent1"/>
-          </a:fillRef>
-          <a:effectRef idx="0">
-            <a:schemeClr val="accent1"/>
-          </a:effectRef>
-          <a:fontRef idx="minor">
-            <a:schemeClr val="tx1"/>
-          </a:fontRef>
-        </p:style>
-      </p:cxnSp>
-      <p:cxnSp>
-        <p:nvCxnSpPr>
-          <p:cNvPr id="255" name="Curved Connector 254"/>
-          <p:cNvCxnSpPr>
-            <a:stCxn id="246" idx="3"/>
-            <a:endCxn id="85" idx="1"/>
-          </p:cNvCxnSpPr>
-          <p:nvPr/>
-        </p:nvCxnSpPr>
-        <p:spPr>
-          <a:xfrm flipV="1">
-            <a:off x="5123073" y="2172220"/>
-            <a:ext cx="1937678" cy="74685"/>
-          </a:xfrm>
-          <a:prstGeom prst="curvedConnector3">
-            <a:avLst>
-              <a:gd name="adj1" fmla="val 50000"/>
             </a:avLst>
           </a:prstGeom>
           <a:ln>
@@ -16827,7 +16692,7 @@
         </p:nvSpPr>
         <p:spPr>
           <a:xfrm>
-            <a:off x="5994484" y="2276375"/>
+            <a:off x="5984403" y="2301921"/>
             <a:ext cx="926173" cy="240701"/>
           </a:xfrm>
           <a:prstGeom prst="roundRect">
@@ -16895,8 +16760,8 @@
         </p:nvCxnSpPr>
         <p:spPr>
           <a:xfrm rot="5400000">
-            <a:off x="6527150" y="1773860"/>
-            <a:ext cx="432937" cy="572093"/>
+            <a:off x="6509336" y="1781592"/>
+            <a:ext cx="458483" cy="582174"/>
           </a:xfrm>
           <a:prstGeom prst="curvedConnector3">
             <a:avLst>
@@ -16939,9 +16804,9 @@
           <p:nvPr/>
         </p:nvCxnSpPr>
         <p:spPr>
-          <a:xfrm rot="16200000" flipH="1">
-            <a:off x="6409253" y="2565394"/>
-            <a:ext cx="144554" cy="47918"/>
+          <a:xfrm rot="5400000">
+            <a:off x="6360775" y="2610583"/>
+            <a:ext cx="154676" cy="18755"/>
           </a:xfrm>
           <a:prstGeom prst="curvedConnector3">
             <a:avLst>
@@ -16986,7 +16851,7 @@
         <p:spPr>
           <a:xfrm>
             <a:off x="5123073" y="2246905"/>
-            <a:ext cx="871411" cy="149821"/>
+            <a:ext cx="861330" cy="175367"/>
           </a:xfrm>
           <a:prstGeom prst="curvedConnector3">
             <a:avLst>
@@ -17030,12 +16895,12 @@
         </p:nvCxnSpPr>
         <p:spPr>
           <a:xfrm rot="16200000" flipH="1">
-            <a:off x="6544957" y="2328144"/>
-            <a:ext cx="1216139" cy="246725"/>
+            <a:off x="6671922" y="2201180"/>
+            <a:ext cx="1382531" cy="667046"/>
           </a:xfrm>
           <a:prstGeom prst="curvedConnector3">
             <a:avLst>
-              <a:gd name="adj1" fmla="val 50001"/>
+              <a:gd name="adj1" fmla="val 50000"/>
             </a:avLst>
           </a:prstGeom>
           <a:ln>
@@ -18594,44 +18459,6 @@
           <a:prstGeom prst="curvedConnector3">
             <a:avLst>
               <a:gd name="adj1" fmla="val 124206"/>
-            </a:avLst>
-          </a:prstGeom>
-          <a:ln>
-            <a:tailEnd type="triangle"/>
-          </a:ln>
-        </p:spPr>
-        <p:style>
-          <a:lnRef idx="1">
-            <a:schemeClr val="accent1"/>
-          </a:lnRef>
-          <a:fillRef idx="0">
-            <a:schemeClr val="accent1"/>
-          </a:fillRef>
-          <a:effectRef idx="0">
-            <a:schemeClr val="accent1"/>
-          </a:effectRef>
-          <a:fontRef idx="minor">
-            <a:schemeClr val="tx1"/>
-          </a:fontRef>
-        </p:style>
-      </p:cxnSp>
-      <p:cxnSp>
-        <p:nvCxnSpPr>
-          <p:cNvPr id="586" name="Curved Connector 585"/>
-          <p:cNvCxnSpPr>
-            <a:endCxn id="82" idx="3"/>
-          </p:cNvCxnSpPr>
-          <p:nvPr/>
-        </p:nvCxnSpPr>
-        <p:spPr>
-          <a:xfrm rot="16200000" flipH="1">
-            <a:off x="6489927" y="3362078"/>
-            <a:ext cx="2227422" cy="121183"/>
-          </a:xfrm>
-          <a:prstGeom prst="curvedConnector4">
-            <a:avLst>
-              <a:gd name="adj1" fmla="val 10351"/>
-              <a:gd name="adj2" fmla="val 288640"/>
             </a:avLst>
           </a:prstGeom>
           <a:ln>

</xml_diff>